<commit_message>
added slide to Week 3 lecture
</commit_message>
<xml_diff>
--- a/Week 3 -- Temporal Models/Lecture/Lecture 3 -- Kalman filter.pptx
+++ b/Week 3 -- Temporal Models/Lecture/Lecture 3 -- Kalman filter.pptx
@@ -5,28 +5,29 @@
     <p:sldMasterId id="2147483672" r:id="rId1"/>
   </p:sldMasterIdLst>
   <p:notesMasterIdLst>
-    <p:notesMasterId r:id="rId21"/>
+    <p:notesMasterId r:id="rId22"/>
   </p:notesMasterIdLst>
   <p:sldIdLst>
     <p:sldId id="266" r:id="rId2"/>
     <p:sldId id="301" r:id="rId3"/>
     <p:sldId id="302" r:id="rId4"/>
     <p:sldId id="321" r:id="rId5"/>
-    <p:sldId id="324" r:id="rId6"/>
-    <p:sldId id="325" r:id="rId7"/>
-    <p:sldId id="328" r:id="rId8"/>
-    <p:sldId id="334" r:id="rId9"/>
-    <p:sldId id="337" r:id="rId10"/>
-    <p:sldId id="329" r:id="rId11"/>
-    <p:sldId id="330" r:id="rId12"/>
-    <p:sldId id="331" r:id="rId13"/>
-    <p:sldId id="335" r:id="rId14"/>
-    <p:sldId id="336" r:id="rId15"/>
-    <p:sldId id="332" r:id="rId16"/>
-    <p:sldId id="338" r:id="rId17"/>
-    <p:sldId id="326" r:id="rId18"/>
-    <p:sldId id="327" r:id="rId19"/>
-    <p:sldId id="333" r:id="rId20"/>
+    <p:sldId id="339" r:id="rId6"/>
+    <p:sldId id="324" r:id="rId7"/>
+    <p:sldId id="325" r:id="rId8"/>
+    <p:sldId id="328" r:id="rId9"/>
+    <p:sldId id="334" r:id="rId10"/>
+    <p:sldId id="337" r:id="rId11"/>
+    <p:sldId id="329" r:id="rId12"/>
+    <p:sldId id="330" r:id="rId13"/>
+    <p:sldId id="331" r:id="rId14"/>
+    <p:sldId id="335" r:id="rId15"/>
+    <p:sldId id="336" r:id="rId16"/>
+    <p:sldId id="332" r:id="rId17"/>
+    <p:sldId id="338" r:id="rId18"/>
+    <p:sldId id="326" r:id="rId19"/>
+    <p:sldId id="327" r:id="rId20"/>
+    <p:sldId id="333" r:id="rId21"/>
   </p:sldIdLst>
   <p:sldSz cx="9144000" cy="6858000" type="screen4x3"/>
   <p:notesSz cx="6858000" cy="9144000"/>
@@ -215,7 +216,7 @@
           <a:p>
             <a:fld id="{1522831B-4FE3-4D45-950B-0D2C6BB2DD76}" type="datetimeFigureOut">
               <a:rPr lang="en-US" smtClean="0"/>
-              <a:t>4/9/2018</a:t>
+              <a:t>4/10/2018</a:t>
             </a:fld>
             <a:endParaRPr lang="en-US"/>
           </a:p>
@@ -3593,6 +3594,120 @@
             </a:pPr>
             <a:r>
               <a:rPr lang="en-US" b="1" dirty="0" smtClean="0"/>
+              <a:t>Linear model</a:t>
+            </a:r>
+          </a:p>
+          <a:p>
+            <a:pPr marL="0" indent="0">
+              <a:buNone/>
+            </a:pPr>
+            <a:r>
+              <a:rPr lang="en-US" i="1" dirty="0" smtClean="0"/>
+              <a:t>Problems</a:t>
+            </a:r>
+          </a:p>
+          <a:p>
+            <a:r>
+              <a:rPr lang="en-US" dirty="0" smtClean="0"/>
+              <a:t>Huge residuals at beginning and ending</a:t>
+            </a:r>
+          </a:p>
+          <a:p>
+            <a:r>
+              <a:rPr lang="en-US" dirty="0" smtClean="0"/>
+              <a:t>Predictive variance is larger at beginning and end of series</a:t>
+            </a:r>
+          </a:p>
+          <a:p>
+            <a:r>
+              <a:rPr lang="en-US" dirty="0" smtClean="0"/>
+              <a:t>Doesn’t contain the true value very often</a:t>
+            </a:r>
+          </a:p>
+          <a:p>
+            <a:r>
+              <a:rPr lang="en-US" dirty="0" smtClean="0"/>
+              <a:t>Not sufficiently flexible</a:t>
+            </a:r>
+          </a:p>
+        </p:txBody>
+      </p:sp>
+    </p:spTree>
+    <p:extLst>
+      <p:ext uri="{BB962C8B-B14F-4D97-AF65-F5344CB8AC3E}">
+        <p14:creationId xmlns:p14="http://schemas.microsoft.com/office/powerpoint/2010/main" val="3655526957"/>
+      </p:ext>
+    </p:extLst>
+  </p:cSld>
+  <p:clrMapOvr>
+    <a:masterClrMapping/>
+  </p:clrMapOvr>
+  <p:timing>
+    <p:tnLst>
+      <p:par>
+        <p:cTn id="1" dur="indefinite" restart="never" nodeType="tmRoot"/>
+      </p:par>
+    </p:tnLst>
+  </p:timing>
+</p:sld>
+</file>
+
+<file path=ppt/slides/slide11.xml><?xml version="1.0" encoding="utf-8"?>
+<p:sld xmlns:a="http://schemas.openxmlformats.org/drawingml/2006/main" xmlns:r="http://schemas.openxmlformats.org/officeDocument/2006/relationships" xmlns:p="http://schemas.openxmlformats.org/presentationml/2006/main">
+  <p:cSld>
+    <p:spTree>
+      <p:nvGrpSpPr>
+        <p:cNvPr id="1" name=""/>
+        <p:cNvGrpSpPr/>
+        <p:nvPr/>
+      </p:nvGrpSpPr>
+      <p:grpSpPr>
+        <a:xfrm>
+          <a:off x="0" y="0"/>
+          <a:ext cx="0" cy="0"/>
+          <a:chOff x="0" y="0"/>
+          <a:chExt cx="0" cy="0"/>
+        </a:xfrm>
+      </p:grpSpPr>
+      <p:sp>
+        <p:nvSpPr>
+          <p:cNvPr id="2" name="Title 1"/>
+          <p:cNvSpPr>
+            <a:spLocks noGrp="1"/>
+          </p:cNvSpPr>
+          <p:nvPr>
+            <p:ph type="title"/>
+          </p:nvPr>
+        </p:nvSpPr>
+        <p:spPr/>
+        <p:txBody>
+          <a:bodyPr/>
+          <a:lstStyle/>
+          <a:p>
+            <a:endParaRPr lang="en-GB"/>
+          </a:p>
+        </p:txBody>
+      </p:sp>
+      <p:sp>
+        <p:nvSpPr>
+          <p:cNvPr id="3" name="Content Placeholder 2"/>
+          <p:cNvSpPr>
+            <a:spLocks noGrp="1"/>
+          </p:cNvSpPr>
+          <p:nvPr>
+            <p:ph idx="1"/>
+          </p:nvPr>
+        </p:nvSpPr>
+        <p:spPr/>
+        <p:txBody>
+          <a:bodyPr/>
+          <a:lstStyle/>
+          <a:p>
+            <a:pPr marL="0" indent="0">
+              <a:buNone/>
+            </a:pPr>
+            <a:r>
+              <a:rPr lang="en-US" b="1" dirty="0" smtClean="0"/>
               <a:t>Loess smoother</a:t>
             </a:r>
           </a:p>
@@ -3648,7 +3763,7 @@
 </p:sld>
 </file>
 
-<file path=ppt/slides/slide11.xml><?xml version="1.0" encoding="utf-8"?>
+<file path=ppt/slides/slide12.xml><?xml version="1.0" encoding="utf-8"?>
 <p:sld xmlns:a="http://schemas.openxmlformats.org/drawingml/2006/main" xmlns:r="http://schemas.openxmlformats.org/officeDocument/2006/relationships" xmlns:p="http://schemas.openxmlformats.org/presentationml/2006/main">
   <p:cSld>
     <p:spTree>
@@ -3759,7 +3874,7 @@
 </p:sld>
 </file>
 
-<file path=ppt/slides/slide12.xml><?xml version="1.0" encoding="utf-8"?>
+<file path=ppt/slides/slide13.xml><?xml version="1.0" encoding="utf-8"?>
 <p:sld xmlns:a="http://schemas.openxmlformats.org/drawingml/2006/main" xmlns:r="http://schemas.openxmlformats.org/officeDocument/2006/relationships" xmlns:p="http://schemas.openxmlformats.org/presentationml/2006/main">
   <p:cSld>
     <p:spTree>
@@ -4103,7 +4218,7 @@
 </p:sld>
 </file>
 
-<file path=ppt/slides/slide13.xml><?xml version="1.0" encoding="utf-8"?>
+<file path=ppt/slides/slide14.xml><?xml version="1.0" encoding="utf-8"?>
 <p:sld xmlns:a="http://schemas.openxmlformats.org/drawingml/2006/main" xmlns:r="http://schemas.openxmlformats.org/officeDocument/2006/relationships" xmlns:p="http://schemas.openxmlformats.org/presentationml/2006/main">
   <p:cSld>
     <p:spTree>
@@ -4214,7 +4329,7 @@
 </p:sld>
 </file>
 
-<file path=ppt/slides/slide14.xml><?xml version="1.0" encoding="utf-8"?>
+<file path=ppt/slides/slide15.xml><?xml version="1.0" encoding="utf-8"?>
 <p:sld xmlns:a="http://schemas.openxmlformats.org/drawingml/2006/main" xmlns:r="http://schemas.openxmlformats.org/officeDocument/2006/relationships" xmlns:p="http://schemas.openxmlformats.org/presentationml/2006/main">
   <p:cSld>
     <p:spTree>
@@ -4422,7 +4537,7 @@
 </p:sld>
 </file>
 
-<file path=ppt/slides/slide15.xml><?xml version="1.0" encoding="utf-8"?>
+<file path=ppt/slides/slide16.xml><?xml version="1.0" encoding="utf-8"?>
 <p:sld xmlns:a="http://schemas.openxmlformats.org/drawingml/2006/main" xmlns:r="http://schemas.openxmlformats.org/officeDocument/2006/relationships" xmlns:p="http://schemas.openxmlformats.org/presentationml/2006/main">
   <p:cSld>
     <p:spTree>
@@ -5018,7 +5133,7 @@
 </p:sld>
 </file>
 
-<file path=ppt/slides/slide16.xml><?xml version="1.0" encoding="utf-8"?>
+<file path=ppt/slides/slide17.xml><?xml version="1.0" encoding="utf-8"?>
 <p:sld xmlns:a="http://schemas.openxmlformats.org/drawingml/2006/main" xmlns:r="http://schemas.openxmlformats.org/officeDocument/2006/relationships" xmlns:p="http://schemas.openxmlformats.org/presentationml/2006/main">
   <p:cSld>
     <p:spTree>
@@ -6301,7 +6416,7 @@
 </p:sld>
 </file>
 
-<file path=ppt/slides/slide17.xml><?xml version="1.0" encoding="utf-8"?>
+<file path=ppt/slides/slide18.xml><?xml version="1.0" encoding="utf-8"?>
 <p:sld xmlns:a="http://schemas.openxmlformats.org/drawingml/2006/main" xmlns:r="http://schemas.openxmlformats.org/officeDocument/2006/relationships" xmlns:p="http://schemas.openxmlformats.org/presentationml/2006/main">
   <p:cSld>
     <p:spTree>
@@ -6416,7 +6531,7 @@
 </p:sld>
 </file>
 
-<file path=ppt/slides/slide18.xml><?xml version="1.0" encoding="utf-8"?>
+<file path=ppt/slides/slide19.xml><?xml version="1.0" encoding="utf-8"?>
 <p:sld xmlns:a="http://schemas.openxmlformats.org/drawingml/2006/main" xmlns:r="http://schemas.openxmlformats.org/officeDocument/2006/relationships" xmlns:p="http://schemas.openxmlformats.org/presentationml/2006/main">
   <p:cSld>
     <p:spTree>
@@ -6531,7 +6646,166 @@
 </p:sld>
 </file>
 
-<file path=ppt/slides/slide19.xml><?xml version="1.0" encoding="utf-8"?>
+<file path=ppt/slides/slide2.xml><?xml version="1.0" encoding="utf-8"?>
+<p:sld xmlns:a="http://schemas.openxmlformats.org/drawingml/2006/main" xmlns:r="http://schemas.openxmlformats.org/officeDocument/2006/relationships" xmlns:p="http://schemas.openxmlformats.org/presentationml/2006/main">
+  <p:cSld>
+    <p:spTree>
+      <p:nvGrpSpPr>
+        <p:cNvPr id="1" name=""/>
+        <p:cNvGrpSpPr/>
+        <p:nvPr/>
+      </p:nvGrpSpPr>
+      <p:grpSpPr>
+        <a:xfrm>
+          <a:off x="0" y="0"/>
+          <a:ext cx="0" cy="0"/>
+          <a:chOff x="0" y="0"/>
+          <a:chExt cx="0" cy="0"/>
+        </a:xfrm>
+      </p:grpSpPr>
+      <p:sp>
+        <p:nvSpPr>
+          <p:cNvPr id="2" name="Title 1"/>
+          <p:cNvSpPr>
+            <a:spLocks noGrp="1"/>
+          </p:cNvSpPr>
+          <p:nvPr>
+            <p:ph type="title"/>
+          </p:nvPr>
+        </p:nvSpPr>
+        <p:spPr/>
+        <p:txBody>
+          <a:bodyPr/>
+          <a:lstStyle/>
+          <a:p>
+            <a:r>
+              <a:rPr lang="en-US" dirty="0"/>
+              <a:t>Likelihood statistics</a:t>
+            </a:r>
+          </a:p>
+        </p:txBody>
+      </p:sp>
+      <p:sp>
+        <p:nvSpPr>
+          <p:cNvPr id="3" name="Content Placeholder 2"/>
+          <p:cNvSpPr>
+            <a:spLocks noGrp="1"/>
+          </p:cNvSpPr>
+          <p:nvPr>
+            <p:ph idx="1"/>
+          </p:nvPr>
+        </p:nvSpPr>
+        <p:spPr/>
+        <p:txBody>
+          <a:bodyPr>
+            <a:normAutofit fontScale="92500"/>
+          </a:bodyPr>
+          <a:lstStyle/>
+          <a:p>
+            <a:pPr marL="0" indent="0">
+              <a:buNone/>
+            </a:pPr>
+            <a:r>
+              <a:rPr lang="en-US" dirty="0" smtClean="0"/>
+              <a:t>Problem:</a:t>
+            </a:r>
+          </a:p>
+          <a:p>
+            <a:pPr marL="0" indent="0" algn="ctr">
+              <a:buNone/>
+            </a:pPr>
+            <a:r>
+              <a:rPr lang="en-US" dirty="0" smtClean="0"/>
+              <a:t>We often can’t write the probability of data given parameters</a:t>
+            </a:r>
+          </a:p>
+          <a:p>
+            <a:pPr marL="0" indent="0">
+              <a:buNone/>
+            </a:pPr>
+            <a:r>
+              <a:rPr lang="en-US" dirty="0" smtClean="0"/>
+              <a:t>Examples:</a:t>
+            </a:r>
+          </a:p>
+          <a:p>
+            <a:pPr marL="914400" lvl="1" indent="-514350">
+              <a:buFont typeface="+mj-lt"/>
+              <a:buAutoNum type="arabicPeriod"/>
+            </a:pPr>
+            <a:r>
+              <a:rPr lang="en-US" dirty="0" smtClean="0"/>
+              <a:t>Tag-recapture</a:t>
+            </a:r>
+          </a:p>
+          <a:p>
+            <a:pPr lvl="2" indent="-342900"/>
+            <a:r>
+              <a:rPr lang="en-US" dirty="0" smtClean="0"/>
+              <a:t>What’s the probability of tagging an animal in 2008, seeing it again in 2010 and 2011, and then never seeing it again?</a:t>
+            </a:r>
+          </a:p>
+          <a:p>
+            <a:pPr marL="914400" lvl="1" indent="-514350">
+              <a:buFont typeface="+mj-lt"/>
+              <a:buAutoNum type="arabicPeriod"/>
+            </a:pPr>
+            <a:r>
+              <a:rPr lang="en-US" dirty="0" smtClean="0"/>
+              <a:t>Time-series</a:t>
+            </a:r>
+          </a:p>
+          <a:p>
+            <a:pPr lvl="2" indent="-342900"/>
+            <a:r>
+              <a:rPr lang="en-US" dirty="0" smtClean="0"/>
+              <a:t>What’s the probability distribution for escapement of chinook salmon in the snake river in 2011, given that you’ve sampled escapement from 1980-2010?</a:t>
+            </a:r>
+          </a:p>
+          <a:p>
+            <a:pPr marL="857250" lvl="1" indent="-457200">
+              <a:buFont typeface="+mj-lt"/>
+              <a:buAutoNum type="arabicPeriod"/>
+            </a:pPr>
+            <a:r>
+              <a:rPr lang="en-US" dirty="0" smtClean="0"/>
+              <a:t>Occupancy </a:t>
+            </a:r>
+          </a:p>
+          <a:p>
+            <a:pPr lvl="2" indent="-342900"/>
+            <a:r>
+              <a:rPr lang="en-US" dirty="0" smtClean="0"/>
+              <a:t>Three volunteers look for an endangered butterfly at a site, and only two find it.  These volunteers sample at a new site, and none see the butterfly.  What is the probability that is present but wasn’t detected?</a:t>
+            </a:r>
+          </a:p>
+          <a:p>
+            <a:pPr lvl="1" indent="-342900"/>
+            <a:endParaRPr lang="en-US" dirty="0"/>
+          </a:p>
+        </p:txBody>
+      </p:sp>
+    </p:spTree>
+    <p:extLst>
+      <p:ext uri="{BB962C8B-B14F-4D97-AF65-F5344CB8AC3E}">
+        <p14:creationId xmlns:p14="http://schemas.microsoft.com/office/powerpoint/2010/main" val="1918392905"/>
+      </p:ext>
+    </p:extLst>
+  </p:cSld>
+  <p:clrMapOvr>
+    <a:masterClrMapping/>
+  </p:clrMapOvr>
+  <p:timing>
+    <p:tnLst>
+      <p:par>
+        <p:cTn id="1" dur="indefinite" restart="never" nodeType="tmRoot"/>
+      </p:par>
+    </p:tnLst>
+  </p:timing>
+</p:sld>
+</file>
+
+<file path=ppt/slides/slide20.xml><?xml version="1.0" encoding="utf-8"?>
 <p:sld xmlns:a="http://schemas.openxmlformats.org/drawingml/2006/main" xmlns:r="http://schemas.openxmlformats.org/officeDocument/2006/relationships" xmlns:p="http://schemas.openxmlformats.org/presentationml/2006/main">
   <p:cSld>
     <p:spTree>
@@ -6810,165 +7084,6 @@
             </p:seq>
           </p:childTnLst>
         </p:cTn>
-      </p:par>
-    </p:tnLst>
-  </p:timing>
-</p:sld>
-</file>
-
-<file path=ppt/slides/slide2.xml><?xml version="1.0" encoding="utf-8"?>
-<p:sld xmlns:a="http://schemas.openxmlformats.org/drawingml/2006/main" xmlns:r="http://schemas.openxmlformats.org/officeDocument/2006/relationships" xmlns:p="http://schemas.openxmlformats.org/presentationml/2006/main">
-  <p:cSld>
-    <p:spTree>
-      <p:nvGrpSpPr>
-        <p:cNvPr id="1" name=""/>
-        <p:cNvGrpSpPr/>
-        <p:nvPr/>
-      </p:nvGrpSpPr>
-      <p:grpSpPr>
-        <a:xfrm>
-          <a:off x="0" y="0"/>
-          <a:ext cx="0" cy="0"/>
-          <a:chOff x="0" y="0"/>
-          <a:chExt cx="0" cy="0"/>
-        </a:xfrm>
-      </p:grpSpPr>
-      <p:sp>
-        <p:nvSpPr>
-          <p:cNvPr id="2" name="Title 1"/>
-          <p:cNvSpPr>
-            <a:spLocks noGrp="1"/>
-          </p:cNvSpPr>
-          <p:nvPr>
-            <p:ph type="title"/>
-          </p:nvPr>
-        </p:nvSpPr>
-        <p:spPr/>
-        <p:txBody>
-          <a:bodyPr/>
-          <a:lstStyle/>
-          <a:p>
-            <a:r>
-              <a:rPr lang="en-US" dirty="0"/>
-              <a:t>Likelihood statistics</a:t>
-            </a:r>
-          </a:p>
-        </p:txBody>
-      </p:sp>
-      <p:sp>
-        <p:nvSpPr>
-          <p:cNvPr id="3" name="Content Placeholder 2"/>
-          <p:cNvSpPr>
-            <a:spLocks noGrp="1"/>
-          </p:cNvSpPr>
-          <p:nvPr>
-            <p:ph idx="1"/>
-          </p:nvPr>
-        </p:nvSpPr>
-        <p:spPr/>
-        <p:txBody>
-          <a:bodyPr>
-            <a:normAutofit fontScale="92500"/>
-          </a:bodyPr>
-          <a:lstStyle/>
-          <a:p>
-            <a:pPr marL="0" indent="0">
-              <a:buNone/>
-            </a:pPr>
-            <a:r>
-              <a:rPr lang="en-US" dirty="0" smtClean="0"/>
-              <a:t>Problem:</a:t>
-            </a:r>
-          </a:p>
-          <a:p>
-            <a:pPr marL="0" indent="0" algn="ctr">
-              <a:buNone/>
-            </a:pPr>
-            <a:r>
-              <a:rPr lang="en-US" dirty="0" smtClean="0"/>
-              <a:t>We often can’t write the probability of data given parameters</a:t>
-            </a:r>
-          </a:p>
-          <a:p>
-            <a:pPr marL="0" indent="0">
-              <a:buNone/>
-            </a:pPr>
-            <a:r>
-              <a:rPr lang="en-US" dirty="0" smtClean="0"/>
-              <a:t>Examples:</a:t>
-            </a:r>
-          </a:p>
-          <a:p>
-            <a:pPr marL="914400" lvl="1" indent="-514350">
-              <a:buFont typeface="+mj-lt"/>
-              <a:buAutoNum type="arabicPeriod"/>
-            </a:pPr>
-            <a:r>
-              <a:rPr lang="en-US" dirty="0" smtClean="0"/>
-              <a:t>Tag-recapture</a:t>
-            </a:r>
-          </a:p>
-          <a:p>
-            <a:pPr lvl="2" indent="-342900"/>
-            <a:r>
-              <a:rPr lang="en-US" dirty="0" smtClean="0"/>
-              <a:t>What’s the probability of tagging an animal in 2008, seeing it again in 2010 and 2011, and then never seeing it again?</a:t>
-            </a:r>
-          </a:p>
-          <a:p>
-            <a:pPr marL="914400" lvl="1" indent="-514350">
-              <a:buFont typeface="+mj-lt"/>
-              <a:buAutoNum type="arabicPeriod"/>
-            </a:pPr>
-            <a:r>
-              <a:rPr lang="en-US" dirty="0" smtClean="0"/>
-              <a:t>Time-series</a:t>
-            </a:r>
-          </a:p>
-          <a:p>
-            <a:pPr lvl="2" indent="-342900"/>
-            <a:r>
-              <a:rPr lang="en-US" dirty="0" smtClean="0"/>
-              <a:t>What’s the probability distribution for escapement of chinook salmon in the snake river in 2011, given that you’ve sampled escapement from 1980-2010?</a:t>
-            </a:r>
-          </a:p>
-          <a:p>
-            <a:pPr marL="857250" lvl="1" indent="-457200">
-              <a:buFont typeface="+mj-lt"/>
-              <a:buAutoNum type="arabicPeriod"/>
-            </a:pPr>
-            <a:r>
-              <a:rPr lang="en-US" dirty="0" smtClean="0"/>
-              <a:t>Occupancy </a:t>
-            </a:r>
-          </a:p>
-          <a:p>
-            <a:pPr lvl="2" indent="-342900"/>
-            <a:r>
-              <a:rPr lang="en-US" dirty="0" smtClean="0"/>
-              <a:t>Three volunteers look for an endangered butterfly at a site, and only two find it.  These volunteers sample at a new site, and none see the butterfly.  What is the probability that is present but wasn’t detected?</a:t>
-            </a:r>
-          </a:p>
-          <a:p>
-            <a:pPr lvl="1" indent="-342900"/>
-            <a:endParaRPr lang="en-US" dirty="0"/>
-          </a:p>
-        </p:txBody>
-      </p:sp>
-    </p:spTree>
-    <p:extLst>
-      <p:ext uri="{BB962C8B-B14F-4D97-AF65-F5344CB8AC3E}">
-        <p14:creationId xmlns:p14="http://schemas.microsoft.com/office/powerpoint/2010/main" val="1918392905"/>
-      </p:ext>
-    </p:extLst>
-  </p:cSld>
-  <p:clrMapOvr>
-    <a:masterClrMapping/>
-  </p:clrMapOvr>
-  <p:timing>
-    <p:tnLst>
-      <p:par>
-        <p:cTn id="1" dur="indefinite" restart="never" nodeType="tmRoot"/>
       </p:par>
     </p:tnLst>
   </p:timing>
@@ -8132,6 +8247,537 @@
           <a:bodyPr/>
           <a:lstStyle/>
           <a:p>
+            <a:endParaRPr lang="en-US"/>
+          </a:p>
+        </p:txBody>
+      </p:sp>
+      <mc:AlternateContent xmlns:mc="http://schemas.openxmlformats.org/markup-compatibility/2006">
+        <mc:Choice xmlns:a14="http://schemas.microsoft.com/office/drawing/2010/main" Requires="a14">
+          <p:sp>
+            <p:nvSpPr>
+              <p:cNvPr id="3" name="Content Placeholder 2"/>
+              <p:cNvSpPr>
+                <a:spLocks noGrp="1"/>
+              </p:cNvSpPr>
+              <p:nvPr>
+                <p:ph idx="1"/>
+              </p:nvPr>
+            </p:nvSpPr>
+            <p:spPr/>
+            <p:txBody>
+              <a:bodyPr/>
+              <a:lstStyle/>
+              <a:p>
+                <a:pPr marL="0" indent="0">
+                  <a:buNone/>
+                </a:pPr>
+                <a:r>
+                  <a:rPr lang="en-US" sz="3200" b="1" dirty="0" smtClean="0"/>
+                  <a:t>What is a state-space model?</a:t>
+                </a:r>
+              </a:p>
+              <a:p>
+                <a:pPr marL="514350" indent="-514350">
+                  <a:buFont typeface="+mj-lt"/>
+                  <a:buAutoNum type="arabicPeriod"/>
+                </a:pPr>
+                <a:r>
+                  <a:rPr lang="en-US" sz="3200" dirty="0" smtClean="0"/>
+                  <a:t>Given measurements </a:t>
+                </a:r>
+                <a14:m>
+                  <m:oMath xmlns:m="http://schemas.openxmlformats.org/officeDocument/2006/math">
+                    <m:sSub>
+                      <m:sSubPr>
+                        <m:ctrlPr>
+                          <a:rPr lang="en-US" sz="3200" b="0" i="1" smtClean="0">
+                            <a:latin typeface="Cambria Math" panose="02040503050406030204" pitchFamily="18" charset="0"/>
+                          </a:rPr>
+                        </m:ctrlPr>
+                      </m:sSubPr>
+                      <m:e>
+                        <m:r>
+                          <a:rPr lang="en-US" sz="3200" b="0" i="1" smtClean="0">
+                            <a:latin typeface="Cambria Math" panose="02040503050406030204" pitchFamily="18" charset="0"/>
+                          </a:rPr>
+                          <m:t>𝑦</m:t>
+                        </m:r>
+                      </m:e>
+                      <m:sub>
+                        <m:r>
+                          <a:rPr lang="en-US" sz="3200" b="0" i="1" smtClean="0">
+                            <a:latin typeface="Cambria Math" panose="02040503050406030204" pitchFamily="18" charset="0"/>
+                          </a:rPr>
+                          <m:t>𝑡</m:t>
+                        </m:r>
+                      </m:sub>
+                    </m:sSub>
+                  </m:oMath>
+                </a14:m>
+                <a:r>
+                  <a:rPr lang="en-US" sz="3200" dirty="0" smtClean="0"/>
+                  <a:t> in each year </a:t>
+                </a:r>
+                <a14:m>
+                  <m:oMath xmlns:m="http://schemas.openxmlformats.org/officeDocument/2006/math">
+                    <m:r>
+                      <a:rPr lang="en-US" sz="3200" b="0" i="1" smtClean="0">
+                        <a:latin typeface="Cambria Math" panose="02040503050406030204" pitchFamily="18" charset="0"/>
+                      </a:rPr>
+                      <m:t>𝑡</m:t>
+                    </m:r>
+                  </m:oMath>
+                </a14:m>
+                <a:r>
+                  <a:rPr lang="en-US" sz="3200" dirty="0" smtClean="0"/>
+                  <a:t>…</a:t>
+                </a:r>
+              </a:p>
+              <a:p>
+                <a:pPr marL="514350" indent="-514350">
+                  <a:buFont typeface="+mj-lt"/>
+                  <a:buAutoNum type="arabicPeriod"/>
+                </a:pPr>
+                <a:r>
+                  <a:rPr lang="en-US" sz="3200" dirty="0" smtClean="0"/>
+                  <a:t>… reconstruct unobserved state </a:t>
+                </a:r>
+                <a14:m>
+                  <m:oMath xmlns:m="http://schemas.openxmlformats.org/officeDocument/2006/math">
+                    <m:sSub>
+                      <m:sSubPr>
+                        <m:ctrlPr>
+                          <a:rPr lang="en-US" sz="3200" b="0" i="1" smtClean="0">
+                            <a:latin typeface="Cambria Math" panose="02040503050406030204" pitchFamily="18" charset="0"/>
+                          </a:rPr>
+                        </m:ctrlPr>
+                      </m:sSubPr>
+                      <m:e>
+                        <m:r>
+                          <a:rPr lang="en-US" sz="3200" b="0" i="1" smtClean="0">
+                            <a:latin typeface="Cambria Math" panose="02040503050406030204" pitchFamily="18" charset="0"/>
+                          </a:rPr>
+                          <m:t>𝑥</m:t>
+                        </m:r>
+                      </m:e>
+                      <m:sub>
+                        <m:r>
+                          <a:rPr lang="en-US" sz="3200" b="0" i="1" smtClean="0">
+                            <a:latin typeface="Cambria Math" panose="02040503050406030204" pitchFamily="18" charset="0"/>
+                          </a:rPr>
+                          <m:t>𝑡</m:t>
+                        </m:r>
+                      </m:sub>
+                    </m:sSub>
+                  </m:oMath>
+                </a14:m>
+                <a:r>
+                  <a:rPr lang="en-US" sz="3200" dirty="0" smtClean="0"/>
+                  <a:t> in each year</a:t>
+                </a:r>
+              </a:p>
+              <a:p>
+                <a:pPr marL="0" indent="0">
+                  <a:buNone/>
+                </a:pPr>
+                <a:endParaRPr lang="en-US" sz="3200" dirty="0"/>
+              </a:p>
+              <a:p>
+                <a:pPr marL="0" indent="0">
+                  <a:buNone/>
+                </a:pPr>
+                <a:r>
+                  <a:rPr lang="en-US" sz="3200" b="1" dirty="0" smtClean="0"/>
+                  <a:t>Why use a state-space model?</a:t>
+                </a:r>
+              </a:p>
+              <a:p>
+                <a:pPr marL="514350" indent="-514350">
+                  <a:buFont typeface="+mj-lt"/>
+                  <a:buAutoNum type="arabicPeriod"/>
+                </a:pPr>
+                <a:r>
+                  <a:rPr lang="en-US" sz="3200" dirty="0" smtClean="0"/>
+                  <a:t>Best predictor for unobserved state</a:t>
+                </a:r>
+              </a:p>
+              <a:p>
+                <a:pPr marL="514350" indent="-514350">
+                  <a:buFont typeface="+mj-lt"/>
+                  <a:buAutoNum type="arabicPeriod"/>
+                </a:pPr>
+                <a:r>
+                  <a:rPr lang="en-US" sz="3200" dirty="0" smtClean="0"/>
+                  <a:t>Decompose variance into “process error” and “measurement error”</a:t>
+                </a:r>
+              </a:p>
+              <a:p>
+                <a:pPr marL="514350" indent="-514350">
+                  <a:buFont typeface="+mj-lt"/>
+                  <a:buAutoNum type="arabicPeriod"/>
+                </a:pPr>
+                <a:r>
+                  <a:rPr lang="en-US" sz="3200" dirty="0" smtClean="0"/>
+                  <a:t>Interpolate / extrapolate outside measurements</a:t>
+                </a:r>
+                <a:endParaRPr lang="en-US" sz="3200" dirty="0" smtClean="0"/>
+              </a:p>
+              <a:p>
+                <a:pPr lvl="1"/>
+                <a:endParaRPr lang="en-US" dirty="0"/>
+              </a:p>
+            </p:txBody>
+          </p:sp>
+        </mc:Choice>
+        <mc:Fallback>
+          <p:sp>
+            <p:nvSpPr>
+              <p:cNvPr id="3" name="Content Placeholder 2"/>
+              <p:cNvSpPr>
+                <a:spLocks noGrp="1" noRot="1" noChangeAspect="1" noMove="1" noResize="1" noEditPoints="1" noAdjustHandles="1" noChangeArrowheads="1" noChangeShapeType="1" noTextEdit="1"/>
+              </p:cNvSpPr>
+              <p:nvPr>
+                <p:ph idx="1"/>
+              </p:nvPr>
+            </p:nvSpPr>
+            <p:spPr>
+              <a:blipFill>
+                <a:blip r:embed="rId2"/>
+                <a:stretch>
+                  <a:fillRect l="-1831" t="-1333"/>
+                </a:stretch>
+              </a:blipFill>
+            </p:spPr>
+            <p:txBody>
+              <a:bodyPr/>
+              <a:lstStyle/>
+              <a:p>
+                <a:r>
+                  <a:rPr lang="en-GB">
+                    <a:noFill/>
+                  </a:rPr>
+                  <a:t> </a:t>
+                </a:r>
+              </a:p>
+            </p:txBody>
+          </p:sp>
+        </mc:Fallback>
+      </mc:AlternateContent>
+    </p:spTree>
+    <p:extLst>
+      <p:ext uri="{BB962C8B-B14F-4D97-AF65-F5344CB8AC3E}">
+        <p14:creationId xmlns:p14="http://schemas.microsoft.com/office/powerpoint/2010/main" val="374475254"/>
+      </p:ext>
+    </p:extLst>
+  </p:cSld>
+  <p:clrMapOvr>
+    <a:masterClrMapping/>
+  </p:clrMapOvr>
+  <p:timing>
+    <p:tnLst>
+      <p:par>
+        <p:cTn id="1" dur="indefinite" restart="never" nodeType="tmRoot">
+          <p:childTnLst>
+            <p:seq concurrent="1" nextAc="seek">
+              <p:cTn id="2" dur="indefinite" nodeType="mainSeq">
+                <p:childTnLst>
+                  <p:par>
+                    <p:cTn id="3" fill="hold">
+                      <p:stCondLst>
+                        <p:cond delay="indefinite"/>
+                      </p:stCondLst>
+                      <p:childTnLst>
+                        <p:par>
+                          <p:cTn id="4" fill="hold">
+                            <p:stCondLst>
+                              <p:cond delay="0"/>
+                            </p:stCondLst>
+                            <p:childTnLst>
+                              <p:par>
+                                <p:cTn id="5" presetID="1" presetClass="entr" presetSubtype="0" fill="hold" nodeType="clickEffect">
+                                  <p:stCondLst>
+                                    <p:cond delay="0"/>
+                                  </p:stCondLst>
+                                  <p:childTnLst>
+                                    <p:set>
+                                      <p:cBhvr>
+                                        <p:cTn id="6" dur="1" fill="hold">
+                                          <p:stCondLst>
+                                            <p:cond delay="0"/>
+                                          </p:stCondLst>
+                                        </p:cTn>
+                                        <p:tgtEl>
+                                          <p:spTgt spid="3">
+                                            <p:txEl>
+                                              <p:pRg st="1" end="1"/>
+                                            </p:txEl>
+                                          </p:spTgt>
+                                        </p:tgtEl>
+                                        <p:attrNameLst>
+                                          <p:attrName>style.visibility</p:attrName>
+                                        </p:attrNameLst>
+                                      </p:cBhvr>
+                                      <p:to>
+                                        <p:strVal val="visible"/>
+                                      </p:to>
+                                    </p:set>
+                                  </p:childTnLst>
+                                </p:cTn>
+                              </p:par>
+                              <p:par>
+                                <p:cTn id="7" presetID="1" presetClass="entr" presetSubtype="0" fill="hold" nodeType="withEffect">
+                                  <p:stCondLst>
+                                    <p:cond delay="0"/>
+                                  </p:stCondLst>
+                                  <p:childTnLst>
+                                    <p:set>
+                                      <p:cBhvr>
+                                        <p:cTn id="8" dur="1" fill="hold">
+                                          <p:stCondLst>
+                                            <p:cond delay="0"/>
+                                          </p:stCondLst>
+                                        </p:cTn>
+                                        <p:tgtEl>
+                                          <p:spTgt spid="3">
+                                            <p:txEl>
+                                              <p:pRg st="2" end="2"/>
+                                            </p:txEl>
+                                          </p:spTgt>
+                                        </p:tgtEl>
+                                        <p:attrNameLst>
+                                          <p:attrName>style.visibility</p:attrName>
+                                        </p:attrNameLst>
+                                      </p:cBhvr>
+                                      <p:to>
+                                        <p:strVal val="visible"/>
+                                      </p:to>
+                                    </p:set>
+                                  </p:childTnLst>
+                                </p:cTn>
+                              </p:par>
+                            </p:childTnLst>
+                          </p:cTn>
+                        </p:par>
+                      </p:childTnLst>
+                    </p:cTn>
+                  </p:par>
+                  <p:par>
+                    <p:cTn id="9" fill="hold">
+                      <p:stCondLst>
+                        <p:cond delay="indefinite"/>
+                      </p:stCondLst>
+                      <p:childTnLst>
+                        <p:par>
+                          <p:cTn id="10" fill="hold">
+                            <p:stCondLst>
+                              <p:cond delay="0"/>
+                            </p:stCondLst>
+                            <p:childTnLst>
+                              <p:par>
+                                <p:cTn id="11" presetID="1" presetClass="entr" presetSubtype="0" fill="hold" nodeType="clickEffect">
+                                  <p:stCondLst>
+                                    <p:cond delay="0"/>
+                                  </p:stCondLst>
+                                  <p:childTnLst>
+                                    <p:set>
+                                      <p:cBhvr>
+                                        <p:cTn id="12" dur="1" fill="hold">
+                                          <p:stCondLst>
+                                            <p:cond delay="0"/>
+                                          </p:stCondLst>
+                                        </p:cTn>
+                                        <p:tgtEl>
+                                          <p:spTgt spid="3">
+                                            <p:txEl>
+                                              <p:pRg st="4" end="4"/>
+                                            </p:txEl>
+                                          </p:spTgt>
+                                        </p:tgtEl>
+                                        <p:attrNameLst>
+                                          <p:attrName>style.visibility</p:attrName>
+                                        </p:attrNameLst>
+                                      </p:cBhvr>
+                                      <p:to>
+                                        <p:strVal val="visible"/>
+                                      </p:to>
+                                    </p:set>
+                                  </p:childTnLst>
+                                </p:cTn>
+                              </p:par>
+                            </p:childTnLst>
+                          </p:cTn>
+                        </p:par>
+                      </p:childTnLst>
+                    </p:cTn>
+                  </p:par>
+                  <p:par>
+                    <p:cTn id="13" fill="hold">
+                      <p:stCondLst>
+                        <p:cond delay="indefinite"/>
+                      </p:stCondLst>
+                      <p:childTnLst>
+                        <p:par>
+                          <p:cTn id="14" fill="hold">
+                            <p:stCondLst>
+                              <p:cond delay="0"/>
+                            </p:stCondLst>
+                            <p:childTnLst>
+                              <p:par>
+                                <p:cTn id="15" presetID="1" presetClass="entr" presetSubtype="0" fill="hold" nodeType="clickEffect">
+                                  <p:stCondLst>
+                                    <p:cond delay="0"/>
+                                  </p:stCondLst>
+                                  <p:childTnLst>
+                                    <p:set>
+                                      <p:cBhvr>
+                                        <p:cTn id="16" dur="1" fill="hold">
+                                          <p:stCondLst>
+                                            <p:cond delay="0"/>
+                                          </p:stCondLst>
+                                        </p:cTn>
+                                        <p:tgtEl>
+                                          <p:spTgt spid="3">
+                                            <p:txEl>
+                                              <p:pRg st="5" end="5"/>
+                                            </p:txEl>
+                                          </p:spTgt>
+                                        </p:tgtEl>
+                                        <p:attrNameLst>
+                                          <p:attrName>style.visibility</p:attrName>
+                                        </p:attrNameLst>
+                                      </p:cBhvr>
+                                      <p:to>
+                                        <p:strVal val="visible"/>
+                                      </p:to>
+                                    </p:set>
+                                  </p:childTnLst>
+                                </p:cTn>
+                              </p:par>
+                              <p:par>
+                                <p:cTn id="17" presetID="1" presetClass="entr" presetSubtype="0" fill="hold" nodeType="withEffect">
+                                  <p:stCondLst>
+                                    <p:cond delay="0"/>
+                                  </p:stCondLst>
+                                  <p:childTnLst>
+                                    <p:set>
+                                      <p:cBhvr>
+                                        <p:cTn id="18" dur="1" fill="hold">
+                                          <p:stCondLst>
+                                            <p:cond delay="0"/>
+                                          </p:stCondLst>
+                                        </p:cTn>
+                                        <p:tgtEl>
+                                          <p:spTgt spid="3">
+                                            <p:txEl>
+                                              <p:pRg st="6" end="6"/>
+                                            </p:txEl>
+                                          </p:spTgt>
+                                        </p:tgtEl>
+                                        <p:attrNameLst>
+                                          <p:attrName>style.visibility</p:attrName>
+                                        </p:attrNameLst>
+                                      </p:cBhvr>
+                                      <p:to>
+                                        <p:strVal val="visible"/>
+                                      </p:to>
+                                    </p:set>
+                                  </p:childTnLst>
+                                </p:cTn>
+                              </p:par>
+                              <p:par>
+                                <p:cTn id="19" presetID="1" presetClass="entr" presetSubtype="0" fill="hold" nodeType="withEffect">
+                                  <p:stCondLst>
+                                    <p:cond delay="0"/>
+                                  </p:stCondLst>
+                                  <p:childTnLst>
+                                    <p:set>
+                                      <p:cBhvr>
+                                        <p:cTn id="20" dur="1" fill="hold">
+                                          <p:stCondLst>
+                                            <p:cond delay="0"/>
+                                          </p:stCondLst>
+                                        </p:cTn>
+                                        <p:tgtEl>
+                                          <p:spTgt spid="3">
+                                            <p:txEl>
+                                              <p:pRg st="7" end="7"/>
+                                            </p:txEl>
+                                          </p:spTgt>
+                                        </p:tgtEl>
+                                        <p:attrNameLst>
+                                          <p:attrName>style.visibility</p:attrName>
+                                        </p:attrNameLst>
+                                      </p:cBhvr>
+                                      <p:to>
+                                        <p:strVal val="visible"/>
+                                      </p:to>
+                                    </p:set>
+                                  </p:childTnLst>
+                                </p:cTn>
+                              </p:par>
+                            </p:childTnLst>
+                          </p:cTn>
+                        </p:par>
+                      </p:childTnLst>
+                    </p:cTn>
+                  </p:par>
+                </p:childTnLst>
+              </p:cTn>
+              <p:prevCondLst>
+                <p:cond evt="onPrev" delay="0">
+                  <p:tgtEl>
+                    <p:sldTgt/>
+                  </p:tgtEl>
+                </p:cond>
+              </p:prevCondLst>
+              <p:nextCondLst>
+                <p:cond evt="onNext" delay="0">
+                  <p:tgtEl>
+                    <p:sldTgt/>
+                  </p:tgtEl>
+                </p:cond>
+              </p:nextCondLst>
+            </p:seq>
+          </p:childTnLst>
+        </p:cTn>
+      </p:par>
+    </p:tnLst>
+  </p:timing>
+</p:sld>
+</file>
+
+<file path=ppt/slides/slide6.xml><?xml version="1.0" encoding="utf-8"?>
+<p:sld xmlns:a="http://schemas.openxmlformats.org/drawingml/2006/main" xmlns:r="http://schemas.openxmlformats.org/officeDocument/2006/relationships" xmlns:p="http://schemas.openxmlformats.org/presentationml/2006/main">
+  <p:cSld>
+    <p:spTree>
+      <p:nvGrpSpPr>
+        <p:cNvPr id="1" name=""/>
+        <p:cNvGrpSpPr/>
+        <p:nvPr/>
+      </p:nvGrpSpPr>
+      <p:grpSpPr>
+        <a:xfrm>
+          <a:off x="0" y="0"/>
+          <a:ext cx="0" cy="0"/>
+          <a:chOff x="0" y="0"/>
+          <a:chExt cx="0" cy="0"/>
+        </a:xfrm>
+      </p:grpSpPr>
+      <p:sp>
+        <p:nvSpPr>
+          <p:cNvPr id="2" name="Title 1"/>
+          <p:cNvSpPr>
+            <a:spLocks noGrp="1"/>
+          </p:cNvSpPr>
+          <p:nvPr>
+            <p:ph type="title"/>
+          </p:nvPr>
+        </p:nvSpPr>
+        <p:spPr/>
+        <p:txBody>
+          <a:bodyPr/>
+          <a:lstStyle/>
+          <a:p>
             <a:endParaRPr lang="en-GB"/>
           </a:p>
         </p:txBody>
@@ -8630,7 +9276,7 @@
 </p:sld>
 </file>
 
-<file path=ppt/slides/slide6.xml><?xml version="1.0" encoding="utf-8"?>
+<file path=ppt/slides/slide7.xml><?xml version="1.0" encoding="utf-8"?>
 <p:sld xmlns:a="http://schemas.openxmlformats.org/drawingml/2006/main" xmlns:r="http://schemas.openxmlformats.org/officeDocument/2006/relationships" xmlns:p="http://schemas.openxmlformats.org/presentationml/2006/main">
   <p:cSld>
     <p:spTree>
@@ -8741,135 +9387,6 @@
 </p:sld>
 </file>
 
-<file path=ppt/slides/slide7.xml><?xml version="1.0" encoding="utf-8"?>
-<p:sld xmlns:a="http://schemas.openxmlformats.org/drawingml/2006/main" xmlns:r="http://schemas.openxmlformats.org/officeDocument/2006/relationships" xmlns:p="http://schemas.openxmlformats.org/presentationml/2006/main">
-  <p:cSld>
-    <p:spTree>
-      <p:nvGrpSpPr>
-        <p:cNvPr id="1" name=""/>
-        <p:cNvGrpSpPr/>
-        <p:nvPr/>
-      </p:nvGrpSpPr>
-      <p:grpSpPr>
-        <a:xfrm>
-          <a:off x="0" y="0"/>
-          <a:ext cx="0" cy="0"/>
-          <a:chOff x="0" y="0"/>
-          <a:chExt cx="0" cy="0"/>
-        </a:xfrm>
-      </p:grpSpPr>
-      <p:sp>
-        <p:nvSpPr>
-          <p:cNvPr id="2" name="Title 1"/>
-          <p:cNvSpPr>
-            <a:spLocks noGrp="1"/>
-          </p:cNvSpPr>
-          <p:nvPr>
-            <p:ph type="title"/>
-          </p:nvPr>
-        </p:nvSpPr>
-        <p:spPr/>
-        <p:txBody>
-          <a:bodyPr/>
-          <a:lstStyle/>
-          <a:p>
-            <a:endParaRPr lang="en-GB"/>
-          </a:p>
-        </p:txBody>
-      </p:sp>
-      <p:sp>
-        <p:nvSpPr>
-          <p:cNvPr id="3" name="Content Placeholder 2"/>
-          <p:cNvSpPr>
-            <a:spLocks noGrp="1"/>
-          </p:cNvSpPr>
-          <p:nvPr>
-            <p:ph idx="1"/>
-          </p:nvPr>
-        </p:nvSpPr>
-        <p:spPr/>
-        <p:txBody>
-          <a:bodyPr/>
-          <a:lstStyle/>
-          <a:p>
-            <a:pPr marL="0" indent="0">
-              <a:buNone/>
-            </a:pPr>
-            <a:r>
-              <a:rPr lang="en-US" b="1" dirty="0" smtClean="0"/>
-              <a:t>Approaches</a:t>
-            </a:r>
-            <a:br>
-              <a:rPr lang="en-US" b="1" dirty="0" smtClean="0"/>
-            </a:br>
-            <a:endParaRPr lang="en-US" b="1" dirty="0" smtClean="0"/>
-          </a:p>
-          <a:p>
-            <a:pPr marL="514350" indent="-514350">
-              <a:buFont typeface="+mj-lt"/>
-              <a:buAutoNum type="arabicPeriod"/>
-            </a:pPr>
-            <a:r>
-              <a:rPr lang="en-US" b="1" dirty="0" smtClean="0"/>
-              <a:t>Linear model</a:t>
-            </a:r>
-          </a:p>
-          <a:p>
-            <a:pPr marL="514350" indent="-514350">
-              <a:buFont typeface="+mj-lt"/>
-              <a:buAutoNum type="arabicPeriod"/>
-            </a:pPr>
-            <a:r>
-              <a:rPr lang="en-US" b="1" dirty="0" smtClean="0"/>
-              <a:t>Loess smoother</a:t>
-            </a:r>
-          </a:p>
-          <a:p>
-            <a:pPr marL="514350" indent="-514350">
-              <a:buFont typeface="+mj-lt"/>
-              <a:buAutoNum type="arabicPeriod"/>
-            </a:pPr>
-            <a:r>
-              <a:rPr lang="en-US" b="1" dirty="0" smtClean="0"/>
-              <a:t>Generalized additive model</a:t>
-            </a:r>
-          </a:p>
-          <a:p>
-            <a:pPr marL="514350" indent="-514350">
-              <a:buFont typeface="+mj-lt"/>
-              <a:buAutoNum type="arabicPeriod"/>
-            </a:pPr>
-            <a:r>
-              <a:rPr lang="en-US" b="1" dirty="0" err="1" smtClean="0"/>
-              <a:t>Kalman</a:t>
-            </a:r>
-            <a:r>
-              <a:rPr lang="en-US" b="1" dirty="0" smtClean="0"/>
-              <a:t> filter</a:t>
-            </a:r>
-          </a:p>
-        </p:txBody>
-      </p:sp>
-    </p:spTree>
-    <p:extLst>
-      <p:ext uri="{BB962C8B-B14F-4D97-AF65-F5344CB8AC3E}">
-        <p14:creationId xmlns:p14="http://schemas.microsoft.com/office/powerpoint/2010/main" val="2450597817"/>
-      </p:ext>
-    </p:extLst>
-  </p:cSld>
-  <p:clrMapOvr>
-    <a:masterClrMapping/>
-  </p:clrMapOvr>
-  <p:timing>
-    <p:tnLst>
-      <p:par>
-        <p:cTn id="1" dur="indefinite" restart="never" nodeType="tmRoot"/>
-      </p:par>
-    </p:tnLst>
-  </p:timing>
-</p:sld>
-</file>
-
 <file path=ppt/slides/slide8.xml><?xml version="1.0" encoding="utf-8"?>
 <p:sld xmlns:a="http://schemas.openxmlformats.org/drawingml/2006/main" xmlns:r="http://schemas.openxmlformats.org/officeDocument/2006/relationships" xmlns:p="http://schemas.openxmlformats.org/presentationml/2006/main">
   <p:cSld>
@@ -8926,45 +9443,63 @@
             </a:pPr>
             <a:r>
               <a:rPr lang="en-US" b="1" dirty="0" smtClean="0"/>
+              <a:t>Approaches</a:t>
+            </a:r>
+            <a:br>
+              <a:rPr lang="en-US" b="1" dirty="0" smtClean="0"/>
+            </a:br>
+            <a:endParaRPr lang="en-US" b="1" dirty="0" smtClean="0"/>
+          </a:p>
+          <a:p>
+            <a:pPr marL="514350" indent="-514350">
+              <a:buFont typeface="+mj-lt"/>
+              <a:buAutoNum type="arabicPeriod"/>
+            </a:pPr>
+            <a:r>
+              <a:rPr lang="en-US" dirty="0" smtClean="0"/>
               <a:t>Linear model</a:t>
+            </a:r>
+          </a:p>
+          <a:p>
+            <a:pPr marL="514350" indent="-514350">
+              <a:buFont typeface="+mj-lt"/>
+              <a:buAutoNum type="arabicPeriod"/>
+            </a:pPr>
+            <a:r>
+              <a:rPr lang="en-US" dirty="0" smtClean="0"/>
+              <a:t>Loess smoother</a:t>
+            </a:r>
+          </a:p>
+          <a:p>
+            <a:pPr marL="514350" indent="-514350">
+              <a:buFont typeface="+mj-lt"/>
+              <a:buAutoNum type="arabicPeriod"/>
+            </a:pPr>
+            <a:r>
+              <a:rPr lang="en-US" dirty="0" smtClean="0"/>
+              <a:t>Generalized additive model</a:t>
+            </a:r>
+          </a:p>
+          <a:p>
+            <a:pPr marL="514350" indent="-514350">
+              <a:buFont typeface="+mj-lt"/>
+              <a:buAutoNum type="arabicPeriod"/>
+            </a:pPr>
+            <a:r>
+              <a:rPr lang="en-US" dirty="0" err="1" smtClean="0"/>
+              <a:t>Kalman</a:t>
+            </a:r>
+            <a:r>
+              <a:rPr lang="en-US" dirty="0" smtClean="0"/>
+              <a:t> filter</a:t>
             </a:r>
           </a:p>
         </p:txBody>
       </p:sp>
-      <p:pic>
-        <p:nvPicPr>
-          <p:cNvPr id="5" name="Picture 4"/>
-          <p:cNvPicPr>
-            <a:picLocks noChangeAspect="1"/>
-          </p:cNvPicPr>
-          <p:nvPr/>
-        </p:nvPicPr>
-        <p:blipFill>
-          <a:blip r:embed="rId2">
-            <a:extLst>
-              <a:ext uri="{28A0092B-C50C-407E-A947-70E740481C1C}">
-                <a14:useLocalDpi xmlns:a14="http://schemas.microsoft.com/office/drawing/2010/main" val="0"/>
-              </a:ext>
-            </a:extLst>
-          </a:blip>
-          <a:stretch>
-            <a:fillRect/>
-          </a:stretch>
-        </p:blipFill>
-        <p:spPr>
-          <a:xfrm>
-            <a:off x="914392" y="2109154"/>
-            <a:ext cx="7315215" cy="4572009"/>
-          </a:xfrm>
-          <a:prstGeom prst="rect">
-            <a:avLst/>
-          </a:prstGeom>
-        </p:spPr>
-      </p:pic>
     </p:spTree>
     <p:extLst>
       <p:ext uri="{BB962C8B-B14F-4D97-AF65-F5344CB8AC3E}">
-        <p14:creationId xmlns:p14="http://schemas.microsoft.com/office/powerpoint/2010/main" val="1476689579"/>
+        <p14:creationId xmlns:p14="http://schemas.microsoft.com/office/powerpoint/2010/main" val="2450597817"/>
       </p:ext>
     </p:extLst>
   </p:cSld>
@@ -9040,45 +9575,42 @@
               <a:t>Linear model</a:t>
             </a:r>
           </a:p>
-          <a:p>
-            <a:pPr marL="0" indent="0">
-              <a:buNone/>
-            </a:pPr>
-            <a:r>
-              <a:rPr lang="en-US" i="1" dirty="0" smtClean="0"/>
-              <a:t>Problems</a:t>
-            </a:r>
-          </a:p>
-          <a:p>
-            <a:r>
-              <a:rPr lang="en-US" dirty="0" smtClean="0"/>
-              <a:t>Huge residuals at beginning and ending</a:t>
-            </a:r>
-          </a:p>
-          <a:p>
-            <a:r>
-              <a:rPr lang="en-US" dirty="0" smtClean="0"/>
-              <a:t>Predictive variance is larger at beginning and end of series</a:t>
-            </a:r>
-          </a:p>
-          <a:p>
-            <a:r>
-              <a:rPr lang="en-US" dirty="0" smtClean="0"/>
-              <a:t>Doesn’t contain the true value very often</a:t>
-            </a:r>
-          </a:p>
-          <a:p>
-            <a:r>
-              <a:rPr lang="en-US" dirty="0" smtClean="0"/>
-              <a:t>Not sufficiently flexible</a:t>
-            </a:r>
-          </a:p>
         </p:txBody>
       </p:sp>
+      <p:pic>
+        <p:nvPicPr>
+          <p:cNvPr id="5" name="Picture 4"/>
+          <p:cNvPicPr>
+            <a:picLocks noChangeAspect="1"/>
+          </p:cNvPicPr>
+          <p:nvPr/>
+        </p:nvPicPr>
+        <p:blipFill>
+          <a:blip r:embed="rId2">
+            <a:extLst>
+              <a:ext uri="{28A0092B-C50C-407E-A947-70E740481C1C}">
+                <a14:useLocalDpi xmlns:a14="http://schemas.microsoft.com/office/drawing/2010/main" val="0"/>
+              </a:ext>
+            </a:extLst>
+          </a:blip>
+          <a:stretch>
+            <a:fillRect/>
+          </a:stretch>
+        </p:blipFill>
+        <p:spPr>
+          <a:xfrm>
+            <a:off x="914392" y="2109154"/>
+            <a:ext cx="7315215" cy="4572009"/>
+          </a:xfrm>
+          <a:prstGeom prst="rect">
+            <a:avLst/>
+          </a:prstGeom>
+        </p:spPr>
+      </p:pic>
     </p:spTree>
     <p:extLst>
       <p:ext uri="{BB962C8B-B14F-4D97-AF65-F5344CB8AC3E}">
-        <p14:creationId xmlns:p14="http://schemas.microsoft.com/office/powerpoint/2010/main" val="3655526957"/>
+        <p14:creationId xmlns:p14="http://schemas.microsoft.com/office/powerpoint/2010/main" val="1476689579"/>
       </p:ext>
     </p:extLst>
   </p:cSld>

</xml_diff>